<commit_message>
Projektziel und auftrag angepasst
</commit_message>
<xml_diff>
--- a/documents/projectmanagement/Definition/Ziel_SMART.pptx
+++ b/documents/projectmanagement/Definition/Ziel_SMART.pptx
@@ -6,6 +6,7 @@
   </p:sldMasterIdLst>
   <p:sldIdLst>
     <p:sldId id="256" r:id="rId2"/>
+    <p:sldId id="257" r:id="rId3"/>
   </p:sldIdLst>
   <p:sldSz cx="12192000" cy="6858000"/>
   <p:notesSz cx="6858000" cy="9144000"/>
@@ -2999,14 +3000,14 @@
                 <a:gridCol w="5257800">
                   <a:extLst>
                     <a:ext uri="{9D8B030D-6E8A-4147-A177-3AD203B41FA5}">
-                      <a16:colId xmlns:a16="http://schemas.microsoft.com/office/drawing/2014/main" val="543071372"/>
+                      <a16:colId xmlns="" xmlns:a16="http://schemas.microsoft.com/office/drawing/2014/main" val="543071372"/>
                     </a:ext>
                   </a:extLst>
                 </a:gridCol>
                 <a:gridCol w="5257800">
                   <a:extLst>
                     <a:ext uri="{9D8B030D-6E8A-4147-A177-3AD203B41FA5}">
-                      <a16:colId xmlns:a16="http://schemas.microsoft.com/office/drawing/2014/main" val="750843462"/>
+                      <a16:colId xmlns="" xmlns:a16="http://schemas.microsoft.com/office/drawing/2014/main" val="750843462"/>
                     </a:ext>
                   </a:extLst>
                 </a:gridCol>
@@ -3109,7 +3110,7 @@
                 </a:tc>
                 <a:extLst>
                   <a:ext uri="{0D108BD9-81ED-4DB2-BD59-A6C34878D82A}">
-                    <a16:rowId xmlns:a16="http://schemas.microsoft.com/office/drawing/2014/main" val="592059295"/>
+                    <a16:rowId xmlns="" xmlns:a16="http://schemas.microsoft.com/office/drawing/2014/main" val="592059295"/>
                   </a:ext>
                 </a:extLst>
               </a:tr>
@@ -3179,7 +3180,7 @@
                 </a:tc>
                 <a:extLst>
                   <a:ext uri="{0D108BD9-81ED-4DB2-BD59-A6C34878D82A}">
-                    <a16:rowId xmlns:a16="http://schemas.microsoft.com/office/drawing/2014/main" val="3383136000"/>
+                    <a16:rowId xmlns="" xmlns:a16="http://schemas.microsoft.com/office/drawing/2014/main" val="3383136000"/>
                   </a:ext>
                 </a:extLst>
               </a:tr>
@@ -3254,7 +3255,7 @@
                 </a:tc>
                 <a:extLst>
                   <a:ext uri="{0D108BD9-81ED-4DB2-BD59-A6C34878D82A}">
-                    <a16:rowId xmlns:a16="http://schemas.microsoft.com/office/drawing/2014/main" val="2076048036"/>
+                    <a16:rowId xmlns="" xmlns:a16="http://schemas.microsoft.com/office/drawing/2014/main" val="2076048036"/>
                   </a:ext>
                 </a:extLst>
               </a:tr>
@@ -3316,7 +3317,7 @@
                 </a:tc>
                 <a:extLst>
                   <a:ext uri="{0D108BD9-81ED-4DB2-BD59-A6C34878D82A}">
-                    <a16:rowId xmlns:a16="http://schemas.microsoft.com/office/drawing/2014/main" val="3664696022"/>
+                    <a16:rowId xmlns="" xmlns:a16="http://schemas.microsoft.com/office/drawing/2014/main" val="3664696022"/>
                   </a:ext>
                 </a:extLst>
               </a:tr>
@@ -3383,7 +3384,7 @@
                 </a:tc>
                 <a:extLst>
                   <a:ext uri="{0D108BD9-81ED-4DB2-BD59-A6C34878D82A}">
-                    <a16:rowId xmlns:a16="http://schemas.microsoft.com/office/drawing/2014/main" val="2265614862"/>
+                    <a16:rowId xmlns="" xmlns:a16="http://schemas.microsoft.com/office/drawing/2014/main" val="2265614862"/>
                   </a:ext>
                 </a:extLst>
               </a:tr>
@@ -3424,6 +3425,212 @@
     <p:extLst>
       <p:ext uri="{BB962C8B-B14F-4D97-AF65-F5344CB8AC3E}">
         <p14:creationId xmlns:p14="http://schemas.microsoft.com/office/powerpoint/2010/main" val="3777102967"/>
+      </p:ext>
+    </p:extLst>
+  </p:cSld>
+  <p:clrMapOvr>
+    <a:masterClrMapping/>
+  </p:clrMapOvr>
+</p:sld>
+</file>
+
+<file path=ppt/slides/slide2.xml><?xml version="1.0" encoding="utf-8"?>
+<p:sld xmlns:a="http://schemas.openxmlformats.org/drawingml/2006/main" xmlns:r="http://schemas.openxmlformats.org/officeDocument/2006/relationships" xmlns:p="http://schemas.openxmlformats.org/presentationml/2006/main">
+  <p:cSld>
+    <p:spTree>
+      <p:nvGrpSpPr>
+        <p:cNvPr id="1" name=""/>
+        <p:cNvGrpSpPr/>
+        <p:nvPr/>
+      </p:nvGrpSpPr>
+      <p:grpSpPr>
+        <a:xfrm>
+          <a:off x="0" y="0"/>
+          <a:ext cx="0" cy="0"/>
+          <a:chOff x="0" y="0"/>
+          <a:chExt cx="0" cy="0"/>
+        </a:xfrm>
+      </p:grpSpPr>
+      <p:sp>
+        <p:nvSpPr>
+          <p:cNvPr id="2" name="Titel 1"/>
+          <p:cNvSpPr>
+            <a:spLocks noGrp="1"/>
+          </p:cNvSpPr>
+          <p:nvPr>
+            <p:ph type="title"/>
+          </p:nvPr>
+        </p:nvSpPr>
+        <p:spPr/>
+        <p:txBody>
+          <a:bodyPr/>
+          <a:lstStyle/>
+          <a:p>
+            <a:r>
+              <a:rPr lang="de-DE" dirty="0" smtClean="0"/>
+              <a:t>Zielkreuzmethode</a:t>
+            </a:r>
+            <a:endParaRPr lang="de-DE" dirty="0"/>
+          </a:p>
+        </p:txBody>
+      </p:sp>
+      <p:graphicFrame>
+        <p:nvGraphicFramePr>
+          <p:cNvPr id="4" name="Inhaltsplatzhalter 3"/>
+          <p:cNvGraphicFramePr>
+            <a:graphicFrameLocks noGrp="1"/>
+          </p:cNvGraphicFramePr>
+          <p:nvPr>
+            <p:ph idx="1"/>
+            <p:extLst>
+              <p:ext uri="{D42A27DB-BD31-4B8C-83A1-F6EECF244321}">
+                <p14:modId xmlns:p14="http://schemas.microsoft.com/office/powerpoint/2010/main" val="2871788779"/>
+              </p:ext>
+            </p:extLst>
+          </p:nvPr>
+        </p:nvGraphicFramePr>
+        <p:xfrm>
+          <a:off x="838200" y="1825625"/>
+          <a:ext cx="10515600" cy="4720454"/>
+        </p:xfrm>
+        <a:graphic>
+          <a:graphicData uri="http://schemas.openxmlformats.org/drawingml/2006/table">
+            <a:tbl>
+              <a:tblPr firstRow="1" bandRow="1">
+                <a:tableStyleId>{5C22544A-7EE6-4342-B048-85BDC9FD1C3A}</a:tableStyleId>
+              </a:tblPr>
+              <a:tblGrid>
+                <a:gridCol w="5257800"/>
+                <a:gridCol w="5257800"/>
+              </a:tblGrid>
+              <a:tr h="2360227">
+                <a:tc>
+                  <a:txBody>
+                    <a:bodyPr/>
+                    <a:lstStyle/>
+                    <a:p>
+                      <a:r>
+                        <a:rPr lang="de-DE" b="0" dirty="0" smtClean="0">
+                          <a:solidFill>
+                            <a:schemeClr val="tx1"/>
+                          </a:solidFill>
+                        </a:rPr>
+                        <a:t>Projektanträge werden nicht einheitlich erfasst und gespeichert. So ist weder eine Auswertung, noch ein Überblick möglich.</a:t>
+                      </a:r>
+                      <a:endParaRPr lang="de-DE" b="0" dirty="0">
+                        <a:solidFill>
+                          <a:schemeClr val="tx1"/>
+                        </a:solidFill>
+                      </a:endParaRPr>
+                    </a:p>
+                  </a:txBody>
+                  <a:tcPr>
+                    <a:solidFill>
+                      <a:schemeClr val="accent1">
+                        <a:lumMod val="60000"/>
+                        <a:lumOff val="40000"/>
+                      </a:schemeClr>
+                    </a:solidFill>
+                  </a:tcPr>
+                </a:tc>
+                <a:tc>
+                  <a:txBody>
+                    <a:bodyPr/>
+                    <a:lstStyle/>
+                    <a:p>
+                      <a:r>
+                        <a:rPr lang="de-DE" b="0" dirty="0" smtClean="0">
+                          <a:solidFill>
+                            <a:schemeClr val="tx1"/>
+                          </a:solidFill>
+                        </a:rPr>
+                        <a:t>Es soll eine Software zur Erstellung, Bearbeitung, Verwaltung, Priorisierung und Bewertung von Projektanträgen geplant und erstellt werden.</a:t>
+                      </a:r>
+                    </a:p>
+                    <a:p>
+                      <a:r>
+                        <a:rPr lang="de-DE" b="0" dirty="0" smtClean="0">
+                          <a:solidFill>
+                            <a:schemeClr val="tx1"/>
+                          </a:solidFill>
+                        </a:rPr>
+                        <a:t>Danach sollen die Mitarbeiter in der Software geschult werden, um diesen den Programmeinstieg zu erleichtern.</a:t>
+                      </a:r>
+                      <a:endParaRPr lang="de-DE" b="0" dirty="0">
+                        <a:solidFill>
+                          <a:schemeClr val="tx1"/>
+                        </a:solidFill>
+                      </a:endParaRPr>
+                    </a:p>
+                  </a:txBody>
+                  <a:tcPr>
+                    <a:noFill/>
+                  </a:tcPr>
+                </a:tc>
+              </a:tr>
+              <a:tr h="2360227">
+                <a:tc>
+                  <a:txBody>
+                    <a:bodyPr/>
+                    <a:lstStyle/>
+                    <a:p>
+                      <a:r>
+                        <a:rPr lang="de-DE" b="0" dirty="0" smtClean="0">
+                          <a:solidFill>
+                            <a:schemeClr val="tx1"/>
+                          </a:solidFill>
+                        </a:rPr>
+                        <a:t>Projektanträge können ab dem 09.09.2016 über die Software einheitlich erfasst, bearbeitet, ausgewertet, priorisiert und genehmigt werden. Die Mitarbeiter sind in der Anwendung geschult und können das Programm bedienen. </a:t>
+                      </a:r>
+                      <a:endParaRPr lang="de-DE" b="0" dirty="0">
+                        <a:solidFill>
+                          <a:schemeClr val="tx1"/>
+                        </a:solidFill>
+                      </a:endParaRPr>
+                    </a:p>
+                  </a:txBody>
+                  <a:tcPr>
+                    <a:noFill/>
+                  </a:tcPr>
+                </a:tc>
+                <a:tc>
+                  <a:txBody>
+                    <a:bodyPr/>
+                    <a:lstStyle/>
+                    <a:p>
+                      <a:r>
+                        <a:rPr lang="de-DE" b="0" dirty="0" smtClean="0">
+                          <a:solidFill>
+                            <a:schemeClr val="tx1"/>
+                          </a:solidFill>
+                        </a:rPr>
+                        <a:t>Das Projekt wird für die Supernova AG umgesetzt.</a:t>
+                      </a:r>
+                      <a:endParaRPr lang="de-DE" b="0" dirty="0">
+                        <a:solidFill>
+                          <a:schemeClr val="tx1"/>
+                        </a:solidFill>
+                      </a:endParaRPr>
+                    </a:p>
+                  </a:txBody>
+                  <a:tcPr>
+                    <a:solidFill>
+                      <a:schemeClr val="accent1">
+                        <a:lumMod val="60000"/>
+                        <a:lumOff val="40000"/>
+                      </a:schemeClr>
+                    </a:solidFill>
+                  </a:tcPr>
+                </a:tc>
+              </a:tr>
+            </a:tbl>
+          </a:graphicData>
+        </a:graphic>
+      </p:graphicFrame>
+    </p:spTree>
+    <p:extLst>
+      <p:ext uri="{BB962C8B-B14F-4D97-AF65-F5344CB8AC3E}">
+        <p14:creationId xmlns:p14="http://schemas.microsoft.com/office/powerpoint/2010/main" val="2405680133"/>
       </p:ext>
     </p:extLst>
   </p:cSld>

</xml_diff>